<commit_message>
DEZSYS L02 Java Security started
</commit_message>
<xml_diff>
--- a/DEZSYS/DEZSYS_LoadBalancing_Präsentation/Load Balancing.pptx
+++ b/DEZSYS/DEZSYS_LoadBalancing_Präsentation/Load Balancing.pptx
@@ -250,7 +250,7 @@
           <a:p>
             <a:fld id="{762B48F5-BACC-47D6-A0F7-82FBF9C6BC85}" type="datetimeFigureOut">
               <a:rPr lang="de-DE" smtClean="0"/>
-              <a:t>20.10.2016</a:t>
+              <a:t>21.10.2016</a:t>
             </a:fld>
             <a:endParaRPr lang="de-DE" dirty="0"/>
           </a:p>
@@ -415,7 +415,7 @@
           <a:p>
             <a:fld id="{0CB1CD00-5424-4675-AB18-2C419B060449}" type="datetimeFigureOut">
               <a:rPr lang="de-DE" smtClean="0"/>
-              <a:t>20.10.2016</a:t>
+              <a:t>21.10.2016</a:t>
             </a:fld>
             <a:endParaRPr lang="de-DE" dirty="0"/>
           </a:p>
@@ -4254,7 +4254,15 @@
           <a:p>
             <a:r>
               <a:rPr lang="de-DE" dirty="0" smtClean="0"/>
-              <a:t>Präsentation von Maximilian Seidl, Donnerstag, 20. Oktober 2016</a:t>
+              <a:t>Präsentation von Maximilian Seidl, </a:t>
+            </a:r>
+            <a:r>
+              <a:rPr lang="de-DE" dirty="0" smtClean="0"/>
+              <a:t>Freitag, 21. </a:t>
+            </a:r>
+            <a:r>
+              <a:rPr lang="de-DE" dirty="0" smtClean="0"/>
+              <a:t>Oktober 2016</a:t>
             </a:r>
             <a:endParaRPr lang="de-DE" dirty="0"/>
           </a:p>
@@ -4344,7 +4352,7 @@
         </p:nvSpPr>
         <p:spPr>
           <a:xfrm>
-            <a:off x="1524000" y="1772816"/>
+            <a:off x="1524000" y="2807637"/>
             <a:ext cx="6336704" cy="2277547"/>
           </a:xfrm>
           <a:prstGeom prst="rect">
@@ -4489,14 +4497,32 @@
               <a:buChar char="•"/>
             </a:pPr>
             <a:r>
-              <a:rPr lang="de-AT" sz="2200" dirty="0"/>
+              <a:rPr lang="de-AT" sz="2200" b="1" dirty="0">
+                <a:solidFill>
+                  <a:schemeClr val="tx1">
+                    <a:lumMod val="85000"/>
+                  </a:schemeClr>
+                </a:solidFill>
+              </a:rPr>
               <a:t>selten in herkömmliche LB </a:t>
             </a:r>
             <a:r>
-              <a:rPr lang="de-AT" sz="2200" dirty="0" smtClean="0"/>
+              <a:rPr lang="de-AT" sz="2200" b="1" dirty="0" smtClean="0">
+                <a:solidFill>
+                  <a:schemeClr val="tx1">
+                    <a:lumMod val="85000"/>
+                  </a:schemeClr>
+                </a:solidFill>
+              </a:rPr>
               <a:t>inkludiert</a:t>
             </a:r>
-            <a:endParaRPr lang="de-AT" sz="2200" dirty="0"/>
+            <a:endParaRPr lang="de-AT" sz="2200" b="1" dirty="0">
+              <a:solidFill>
+                <a:schemeClr val="tx1">
+                  <a:lumMod val="85000"/>
+                </a:schemeClr>
+              </a:solidFill>
+            </a:endParaRPr>
           </a:p>
         </p:txBody>
       </p:sp>
@@ -4519,6 +4545,10 @@
               <a:rPr lang="de-DE" sz="2200" smtClean="0"/>
               <a:t>10</a:t>
             </a:fld>
+            <a:r>
+              <a:rPr lang="de-DE" sz="2200" dirty="0" smtClean="0"/>
+              <a:t>/31</a:t>
+            </a:r>
             <a:endParaRPr lang="de-DE" sz="2200" dirty="0"/>
           </a:p>
         </p:txBody>
@@ -4603,7 +4633,7 @@
         </p:nvSpPr>
         <p:spPr>
           <a:xfrm>
-            <a:off x="1524000" y="1772816"/>
+            <a:off x="1524000" y="2924944"/>
             <a:ext cx="6336704" cy="1938992"/>
           </a:xfrm>
           <a:prstGeom prst="rect">
@@ -4725,14 +4755,14 @@
               <a:buChar char="•"/>
             </a:pPr>
             <a:r>
-              <a:rPr lang="de-AT" sz="2200" dirty="0"/>
+              <a:rPr lang="de-AT" sz="2200" b="1" dirty="0"/>
               <a:t>selten in herkömmliche LB </a:t>
             </a:r>
             <a:r>
-              <a:rPr lang="de-AT" sz="2200" dirty="0" smtClean="0"/>
+              <a:rPr lang="de-AT" sz="2200" b="1" dirty="0" smtClean="0"/>
               <a:t>inkludiert</a:t>
             </a:r>
-            <a:endParaRPr lang="de-AT" sz="2200" dirty="0"/>
+            <a:endParaRPr lang="de-AT" sz="2200" b="1" dirty="0"/>
           </a:p>
         </p:txBody>
       </p:sp>
@@ -4755,6 +4785,10 @@
               <a:rPr lang="de-DE" sz="2200" smtClean="0"/>
               <a:t>11</a:t>
             </a:fld>
+            <a:r>
+              <a:rPr lang="de-DE" sz="2200" dirty="0" smtClean="0"/>
+              <a:t>/31</a:t>
+            </a:r>
             <a:endParaRPr lang="de-DE" sz="2200" dirty="0"/>
           </a:p>
         </p:txBody>
@@ -4816,7 +4850,7 @@
         </p:nvSpPr>
         <p:spPr>
           <a:xfrm>
-            <a:off x="8002587" y="908720"/>
+            <a:off x="1102853" y="1119064"/>
             <a:ext cx="3122613" cy="648072"/>
           </a:xfrm>
         </p:spPr>
@@ -4844,7 +4878,7 @@
         </p:nvSpPr>
         <p:spPr>
           <a:xfrm>
-            <a:off x="7680177" y="1772816"/>
+            <a:off x="1102853" y="1916832"/>
             <a:ext cx="4104456" cy="4323184"/>
           </a:xfrm>
         </p:spPr>
@@ -4955,7 +4989,7 @@
         </p:blipFill>
         <p:spPr>
           <a:xfrm>
-            <a:off x="1102853" y="3068960"/>
+            <a:off x="6023992" y="2996952"/>
             <a:ext cx="3505572" cy="2629179"/>
           </a:xfrm>
           <a:prstGeom prst="rect">
@@ -4987,7 +5021,7 @@
         </p:blipFill>
         <p:spPr>
           <a:xfrm>
-            <a:off x="3431704" y="1556792"/>
+            <a:off x="8137612" y="1115515"/>
             <a:ext cx="3384376" cy="2538282"/>
           </a:xfrm>
           <a:prstGeom prst="rect">
@@ -5020,6 +5054,10 @@
               <a:rPr lang="de-DE" sz="2200" smtClean="0"/>
               <a:t>12</a:t>
             </a:fld>
+            <a:r>
+              <a:rPr lang="de-DE" sz="2200" dirty="0" smtClean="0"/>
+              <a:t>/31</a:t>
+            </a:r>
             <a:endParaRPr lang="de-DE" sz="2200" dirty="0"/>
           </a:p>
         </p:txBody>
@@ -5157,11 +5195,11 @@
   <p:clrMapOvr>
     <a:masterClrMapping/>
   </p:clrMapOvr>
-  <mc:AlternateContent xmlns:mc="http://schemas.openxmlformats.org/markup-compatibility/2006" xmlns:p14="http://schemas.microsoft.com/office/powerpoint/2010/main">
-    <mc:Choice Requires="p14">
+  <mc:AlternateContent xmlns:mc="http://schemas.openxmlformats.org/markup-compatibility/2006">
+    <mc:Choice xmlns:p14="http://schemas.microsoft.com/office/powerpoint/2010/main" Requires="p14">
       <p:transition spd="slow" p14:dur="2000"/>
     </mc:Choice>
-    <mc:Fallback xmlns="">
+    <mc:Fallback>
       <p:transition spd="slow"/>
     </mc:Fallback>
   </mc:AlternateContent>
@@ -5389,10 +5427,10 @@
           <a:bodyPr/>
           <a:lstStyle/>
           <a:p>
-            <a:fld id="{E31375A4-56A4-47D6-9801-1991572033F7}" type="slidenum">
-              <a:rPr lang="de-DE" sz="2200" smtClean="0"/>
-              <a:t>14</a:t>
-            </a:fld>
+            <a:r>
+              <a:rPr lang="de-DE" sz="2200" dirty="0" smtClean="0"/>
+              <a:t>14/31</a:t>
+            </a:r>
             <a:endParaRPr lang="de-DE" sz="2200" dirty="0"/>
           </a:p>
         </p:txBody>
@@ -5407,11 +5445,11 @@
   <p:clrMapOvr>
     <a:masterClrMapping/>
   </p:clrMapOvr>
-  <mc:AlternateContent xmlns:mc="http://schemas.openxmlformats.org/markup-compatibility/2006" xmlns:p14="http://schemas.microsoft.com/office/powerpoint/2010/main">
-    <mc:Choice Requires="p14">
+  <mc:AlternateContent xmlns:mc="http://schemas.openxmlformats.org/markup-compatibility/2006">
+    <mc:Choice xmlns:p14="http://schemas.microsoft.com/office/powerpoint/2010/main" Requires="p14">
       <p:transition spd="slow" p14:dur="2000"/>
     </mc:Choice>
-    <mc:Fallback xmlns="">
+    <mc:Fallback>
       <p:transition spd="slow"/>
     </mc:Fallback>
   </mc:AlternateContent>
@@ -5576,6 +5614,10 @@
               <a:rPr lang="de-DE" sz="2200" smtClean="0"/>
               <a:t>15</a:t>
             </a:fld>
+            <a:r>
+              <a:rPr lang="de-DE" sz="2200" dirty="0" smtClean="0"/>
+              <a:t>/31</a:t>
+            </a:r>
             <a:endParaRPr lang="de-DE" sz="2200" dirty="0"/>
           </a:p>
         </p:txBody>
@@ -5626,11 +5668,11 @@
   <p:clrMapOvr>
     <a:masterClrMapping/>
   </p:clrMapOvr>
-  <mc:AlternateContent xmlns:mc="http://schemas.openxmlformats.org/markup-compatibility/2006" xmlns:p14="http://schemas.microsoft.com/office/powerpoint/2010/main">
-    <mc:Choice Requires="p14">
+  <mc:AlternateContent xmlns:mc="http://schemas.openxmlformats.org/markup-compatibility/2006">
+    <mc:Choice xmlns:p14="http://schemas.microsoft.com/office/powerpoint/2010/main" Requires="p14">
       <p:transition spd="slow" p14:dur="2000"/>
     </mc:Choice>
-    <mc:Fallback xmlns="">
+    <mc:Fallback>
       <p:transition spd="slow"/>
     </mc:Fallback>
   </mc:AlternateContent>
@@ -5685,7 +5727,7 @@
             </a:br>
             <a:r>
               <a:rPr lang="de-AT" dirty="0" smtClean="0"/>
-              <a:t>NW-Architektur</a:t>
+              <a:t>NW-Konfiguration</a:t>
             </a:r>
             <a:endParaRPr lang="de-AT" dirty="0"/>
           </a:p>
@@ -5796,7 +5838,11 @@
           <a:p>
             <a:r>
               <a:rPr lang="de-AT" dirty="0" smtClean="0"/>
-              <a:t>Verfahren mit NW-Architektur </a:t>
+              <a:t>Verfahren </a:t>
+            </a:r>
+            <a:r>
+              <a:rPr lang="de-AT" dirty="0" smtClean="0"/>
+              <a:t>mit NW-Konfiguration</a:t>
             </a:r>
             <a:endParaRPr lang="de-AT" dirty="0"/>
           </a:p>
@@ -5812,7 +5858,12 @@
             <p:ph idx="1"/>
           </p:nvPr>
         </p:nvSpPr>
-        <p:spPr/>
+        <p:spPr>
+          <a:xfrm>
+            <a:off x="1524000" y="2620888"/>
+            <a:ext cx="9144000" cy="2608312"/>
+          </a:xfrm>
+        </p:spPr>
         <p:txBody>
           <a:bodyPr>
             <a:normAutofit/>
@@ -5894,7 +5945,10 @@
               <a:rPr lang="de-DE" sz="2200" smtClean="0"/>
               <a:t>17</a:t>
             </a:fld>
-            <a:endParaRPr lang="de-DE" sz="2200" dirty="0"/>
+            <a:r>
+              <a:rPr lang="de-DE" sz="2200" dirty="0" smtClean="0"/>
+              <a:t>/31</a:t>
+            </a:r>
           </a:p>
         </p:txBody>
       </p:sp>
@@ -6208,6 +6262,10 @@
               <a:rPr lang="de-DE" sz="2200" smtClean="0"/>
               <a:t>19</a:t>
             </a:fld>
+            <a:r>
+              <a:rPr lang="de-DE" sz="2200" dirty="0" smtClean="0"/>
+              <a:t>/31</a:t>
+            </a:r>
             <a:endParaRPr lang="de-DE" sz="2200" dirty="0"/>
           </a:p>
         </p:txBody>
@@ -6392,31 +6450,12 @@
           <a:p>
             <a:r>
               <a:rPr lang="de-DE" sz="2400" dirty="0" smtClean="0"/>
-              <a:t>Verfahren mit NW-Architektur</a:t>
-            </a:r>
-            <a:endParaRPr lang="de-DE" sz="2400" dirty="0"/>
-          </a:p>
-          <a:p>
+              <a:t>Verfahren mit </a:t>
+            </a:r>
             <a:r>
               <a:rPr lang="de-DE" sz="2400" dirty="0" smtClean="0"/>
-              <a:t>Load </a:t>
-            </a:r>
-            <a:r>
-              <a:rPr lang="de-DE" sz="2400" dirty="0" err="1" smtClean="0"/>
-              <a:t>Balancer</a:t>
-            </a:r>
-            <a:r>
-              <a:rPr lang="de-DE" sz="2400" dirty="0" smtClean="0"/>
-              <a:t> als </a:t>
-            </a:r>
-            <a:r>
-              <a:rPr lang="de-DE" sz="2400" dirty="0" err="1" smtClean="0"/>
-              <a:t>failover</a:t>
-            </a:r>
-            <a:endParaRPr lang="de-DE" dirty="0" smtClean="0"/>
-          </a:p>
-          <a:p>
-            <a:pPr lvl="1"/>
+              <a:t>NW-Konfiguration</a:t>
+            </a:r>
             <a:endParaRPr lang="de-DE" dirty="0"/>
           </a:p>
           <a:p>
@@ -6446,6 +6485,10 @@
               <a:rPr lang="de-DE" sz="2200" smtClean="0"/>
               <a:t>2</a:t>
             </a:fld>
+            <a:r>
+              <a:rPr lang="de-DE" sz="2200" dirty="0" smtClean="0"/>
+              <a:t>/31</a:t>
+            </a:r>
             <a:endParaRPr lang="de-DE" sz="2200" dirty="0"/>
           </a:p>
         </p:txBody>
@@ -6512,7 +6555,15 @@
           <a:p>
             <a:r>
               <a:rPr lang="de-DE" dirty="0" smtClean="0"/>
-              <a:t>Verfahren mit NW-Architektur -</a:t>
+              <a:t>Verfahren mit </a:t>
+            </a:r>
+            <a:r>
+              <a:rPr lang="de-DE" dirty="0" smtClean="0"/>
+              <a:t>NW-Konfiguration</a:t>
+            </a:r>
+            <a:r>
+              <a:rPr lang="de-DE" dirty="0" smtClean="0"/>
+              <a:t/>
             </a:r>
             <a:br>
               <a:rPr lang="de-DE" dirty="0" smtClean="0"/>
@@ -6556,7 +6607,6 @@
               <a:rPr lang="de-DE" sz="2200" dirty="0" smtClean="0"/>
               <a:t>schreiben verfügbare Dienste</a:t>
             </a:r>
-            <a:endParaRPr lang="de-DE" sz="2200" dirty="0" smtClean="0"/>
           </a:p>
         </p:txBody>
       </p:sp>
@@ -6848,6 +6898,10 @@
               <a:rPr lang="de-DE" sz="2200" smtClean="0"/>
               <a:t>20</a:t>
             </a:fld>
+            <a:r>
+              <a:rPr lang="de-DE" sz="2200" dirty="0" smtClean="0"/>
+              <a:t>/31</a:t>
+            </a:r>
             <a:endParaRPr lang="de-DE" sz="2200" dirty="0"/>
           </a:p>
         </p:txBody>
@@ -7040,7 +7094,15 @@
           <a:p>
             <a:r>
               <a:rPr lang="de-DE" dirty="0"/>
-              <a:t>Verfahren mit NW-Architektur -</a:t>
+              <a:t>Verfahren mit </a:t>
+            </a:r>
+            <a:r>
+              <a:rPr lang="de-DE" dirty="0" smtClean="0"/>
+              <a:t>NW-Konfiguration</a:t>
+            </a:r>
+            <a:r>
+              <a:rPr lang="de-DE" dirty="0"/>
+              <a:t/>
             </a:r>
             <a:br>
               <a:rPr lang="de-DE" dirty="0"/>
@@ -7063,7 +7125,12 @@
             <p:ph idx="1"/>
           </p:nvPr>
         </p:nvSpPr>
-        <p:spPr/>
+        <p:spPr>
+          <a:xfrm>
+            <a:off x="1524000" y="2780928"/>
+            <a:ext cx="9144000" cy="4267200"/>
+          </a:xfrm>
+        </p:spPr>
         <p:txBody>
           <a:bodyPr>
             <a:normAutofit/>
@@ -7128,10 +7195,10 @@
           <a:bodyPr/>
           <a:lstStyle/>
           <a:p>
-            <a:fld id="{E31375A4-56A4-47D6-9801-1991572033F7}" type="slidenum">
-              <a:rPr lang="de-DE" sz="2200" smtClean="0"/>
-              <a:t>21</a:t>
-            </a:fld>
+            <a:r>
+              <a:rPr lang="de-DE" sz="2200" dirty="0" smtClean="0"/>
+              <a:t>21/31</a:t>
+            </a:r>
             <a:endParaRPr lang="de-DE" sz="2200" dirty="0"/>
           </a:p>
         </p:txBody>
@@ -7450,6 +7517,10 @@
               <a:rPr lang="de-DE" sz="2200" smtClean="0"/>
               <a:t>23</a:t>
             </a:fld>
+            <a:r>
+              <a:rPr lang="de-DE" sz="2200" dirty="0" smtClean="0"/>
+              <a:t>/31</a:t>
+            </a:r>
             <a:endParaRPr lang="de-DE" sz="2200" dirty="0"/>
           </a:p>
         </p:txBody>
@@ -7518,7 +7589,15 @@
           <a:p>
             <a:r>
               <a:rPr lang="de-AT" dirty="0" smtClean="0"/>
-              <a:t>Verfahren mit NW-Architektur</a:t>
+              <a:t>Verfahren mit </a:t>
+            </a:r>
+            <a:r>
+              <a:rPr lang="de-AT" dirty="0" smtClean="0"/>
+              <a:t>NW-Konfiguration</a:t>
+            </a:r>
+            <a:r>
+              <a:rPr lang="de-AT" dirty="0" smtClean="0"/>
+              <a:t/>
             </a:r>
             <a:br>
               <a:rPr lang="de-AT" dirty="0" smtClean="0"/>
@@ -7631,10 +7710,10 @@
           <a:bodyPr/>
           <a:lstStyle/>
           <a:p>
-            <a:fld id="{E31375A4-56A4-47D6-9801-1991572033F7}" type="slidenum">
-              <a:rPr lang="de-DE" sz="2200" smtClean="0"/>
-              <a:t>24</a:t>
-            </a:fld>
+            <a:r>
+              <a:rPr lang="de-DE" sz="2200" dirty="0" smtClean="0"/>
+              <a:t>24/37</a:t>
+            </a:r>
             <a:endParaRPr lang="de-DE" sz="2200" dirty="0"/>
           </a:p>
         </p:txBody>
@@ -7856,6 +7935,10 @@
               <a:rPr lang="de-DE" sz="2200" smtClean="0"/>
               <a:t>26</a:t>
             </a:fld>
+            <a:r>
+              <a:rPr lang="de-DE" sz="2200" dirty="0" smtClean="0"/>
+              <a:t>/31</a:t>
+            </a:r>
             <a:endParaRPr lang="de-DE" sz="2200" dirty="0"/>
           </a:p>
         </p:txBody>
@@ -7870,7 +7953,12 @@
             <p:ph idx="1"/>
           </p:nvPr>
         </p:nvSpPr>
-        <p:spPr/>
+        <p:spPr>
+          <a:xfrm>
+            <a:off x="1524000" y="2762200"/>
+            <a:ext cx="9144000" cy="4267200"/>
+          </a:xfrm>
+        </p:spPr>
         <p:txBody>
           <a:bodyPr>
             <a:normAutofit/>
@@ -8076,7 +8164,7 @@
         </p:spPr>
         <p:txBody>
           <a:bodyPr>
-            <a:normAutofit lnSpcReduction="10000"/>
+            <a:normAutofit/>
           </a:bodyPr>
           <a:lstStyle/>
           <a:p>
@@ -8117,8 +8205,38 @@
               <a:buChar char="•"/>
             </a:pPr>
             <a:r>
+              <a:rPr lang="de-AT" sz="2400" dirty="0" err="1" smtClean="0"/>
+              <a:t>routing</a:t>
+            </a:r>
+            <a:r>
+              <a:rPr lang="de-AT" sz="2400" dirty="0" smtClean="0"/>
+              <a:t> </a:t>
+            </a:r>
+            <a:r>
+              <a:rPr lang="de-AT" sz="2400" dirty="0" smtClean="0"/>
+              <a:t>in </a:t>
+            </a:r>
+            <a:r>
+              <a:rPr lang="de-AT" sz="2400" dirty="0" err="1" smtClean="0"/>
+              <a:t>nonrouting</a:t>
+            </a:r>
+            <a:r>
+              <a:rPr lang="de-AT" sz="2400" dirty="0" smtClean="0"/>
+              <a:t> IPs</a:t>
+            </a:r>
+          </a:p>
+          <a:p>
+            <a:pPr lvl="1"/>
+            <a:endParaRPr lang="de-AT" sz="2200" dirty="0" smtClean="0"/>
+          </a:p>
+          <a:p>
+            <a:pPr marL="285750" indent="-285750">
+              <a:buFont typeface="Arial" panose="020B0604020202020204" pitchFamily="34" charset="0"/>
+              <a:buChar char="•"/>
+            </a:pPr>
+            <a:r>
               <a:rPr lang="de-AT" sz="2200" dirty="0" smtClean="0"/>
-              <a:t>LB agieren nie als Router</a:t>
+              <a:t>übernehmen die Firewall</a:t>
             </a:r>
           </a:p>
           <a:p>
@@ -8127,42 +8245,6 @@
               <a:buChar char="•"/>
             </a:pPr>
             <a:r>
-              <a:rPr lang="de-AT" sz="2200" dirty="0" err="1" smtClean="0"/>
-              <a:t>routing</a:t>
-            </a:r>
-            <a:r>
-              <a:rPr lang="de-AT" sz="2200" dirty="0" smtClean="0"/>
-              <a:t> in </a:t>
-            </a:r>
-            <a:r>
-              <a:rPr lang="de-AT" sz="2200" dirty="0" err="1" smtClean="0"/>
-              <a:t>nonrouting</a:t>
-            </a:r>
-            <a:r>
-              <a:rPr lang="de-AT" sz="2200" dirty="0" smtClean="0"/>
-              <a:t> IPs</a:t>
-            </a:r>
-          </a:p>
-          <a:p>
-            <a:pPr lvl="1"/>
-            <a:endParaRPr lang="de-AT" sz="2200" dirty="0" smtClean="0"/>
-          </a:p>
-          <a:p>
-            <a:pPr marL="285750" indent="-285750">
-              <a:buFont typeface="Arial" panose="020B0604020202020204" pitchFamily="34" charset="0"/>
-              <a:buChar char="•"/>
-            </a:pPr>
-            <a:r>
-              <a:rPr lang="de-AT" sz="2200" dirty="0" smtClean="0"/>
-              <a:t>übernehmen die Firewall</a:t>
-            </a:r>
-          </a:p>
-          <a:p>
-            <a:pPr marL="742950" lvl="1" indent="-285750">
-              <a:buFont typeface="Arial" panose="020B0604020202020204" pitchFamily="34" charset="0"/>
-              <a:buChar char="•"/>
-            </a:pPr>
-            <a:r>
               <a:rPr lang="de-AT" sz="2200" dirty="0" smtClean="0"/>
               <a:t>enge Kontrolle über Traffic</a:t>
             </a:r>
@@ -8188,6 +8270,10 @@
               <a:rPr lang="de-DE" sz="2200" smtClean="0"/>
               <a:t>27</a:t>
             </a:fld>
+            <a:r>
+              <a:rPr lang="de-DE" sz="2200" dirty="0" smtClean="0"/>
+              <a:t>/31</a:t>
+            </a:r>
             <a:endParaRPr lang="de-DE" sz="2200" dirty="0"/>
           </a:p>
         </p:txBody>
@@ -8254,7 +8340,15 @@
           <a:p>
             <a:r>
               <a:rPr lang="de-AT" dirty="0" smtClean="0"/>
-              <a:t>Verfahren mit NW-Architektur</a:t>
+              <a:t>Verfahren </a:t>
+            </a:r>
+            <a:r>
+              <a:rPr lang="de-AT" dirty="0" smtClean="0"/>
+              <a:t>mit NW-Konfiguration</a:t>
+            </a:r>
+            <a:r>
+              <a:rPr lang="de-AT" dirty="0" smtClean="0"/>
+              <a:t/>
             </a:r>
             <a:br>
               <a:rPr lang="de-AT" dirty="0" smtClean="0"/>
@@ -8385,6 +8479,10 @@
               <a:rPr lang="de-DE" sz="2200" smtClean="0"/>
               <a:t>28</a:t>
             </a:fld>
+            <a:r>
+              <a:rPr lang="de-DE" sz="2200" dirty="0" smtClean="0"/>
+              <a:t>/31</a:t>
+            </a:r>
             <a:endParaRPr lang="de-DE" sz="2200" dirty="0"/>
           </a:p>
         </p:txBody>
@@ -8593,7 +8691,7 @@
             </a:r>
             <a:r>
               <a:rPr lang="de-AT" dirty="0" smtClean="0"/>
-              <a:t>, Dynamic  Round Robin</a:t>
+              <a:t>, Dynamic Round Robin</a:t>
             </a:r>
             <a:endParaRPr lang="de-AT" dirty="0"/>
           </a:p>
@@ -8661,7 +8759,15 @@
           <a:p>
             <a:r>
               <a:rPr lang="de-AT" dirty="0" smtClean="0"/>
-              <a:t>Verfahren mit NW-Architektur</a:t>
+              <a:t>Verfahren mit </a:t>
+            </a:r>
+            <a:r>
+              <a:rPr lang="de-AT" dirty="0" smtClean="0"/>
+              <a:t>NW-Konfiguration</a:t>
+            </a:r>
+            <a:r>
+              <a:rPr lang="de-AT" dirty="0" smtClean="0"/>
+              <a:t/>
             </a:r>
             <a:br>
               <a:rPr lang="de-AT" dirty="0" smtClean="0"/>
@@ -8745,7 +8851,11 @@
             <a:pPr lvl="2"/>
             <a:r>
               <a:rPr lang="de-AT" sz="2000" dirty="0" smtClean="0"/>
-              <a:t>Vermittlungsschicht im OSI-Modell</a:t>
+              <a:t>Vermittlungsschicht (Network) im </a:t>
+            </a:r>
+            <a:r>
+              <a:rPr lang="de-AT" sz="2000" dirty="0" smtClean="0"/>
+              <a:t>OSI-Modell</a:t>
             </a:r>
             <a:endParaRPr lang="de-AT" sz="2200" dirty="0" smtClean="0"/>
           </a:p>
@@ -8783,6 +8893,10 @@
               <a:rPr lang="de-DE" sz="2200" smtClean="0"/>
               <a:t>30</a:t>
             </a:fld>
+            <a:r>
+              <a:rPr lang="de-DE" sz="2200" dirty="0" smtClean="0"/>
+              <a:t>/31</a:t>
+            </a:r>
             <a:endParaRPr lang="de-DE" sz="2200" dirty="0"/>
           </a:p>
         </p:txBody>
@@ -8880,7 +8994,15 @@
             </a:r>
             <a:r>
               <a:rPr lang="de-AT" dirty="0" smtClean="0"/>
-              <a:t>, Seidl Maximilian Donnerstag, 20. Oktober 2016</a:t>
+              <a:t>, Seidl Maximilian </a:t>
+            </a:r>
+            <a:r>
+              <a:rPr lang="de-AT" dirty="0" smtClean="0"/>
+              <a:t>Freitag, 21. </a:t>
+            </a:r>
+            <a:r>
+              <a:rPr lang="de-AT" dirty="0" smtClean="0"/>
+              <a:t>Oktober 2016</a:t>
             </a:r>
             <a:endParaRPr lang="de-AT" dirty="0"/>
           </a:p>
@@ -8944,15 +9066,14 @@
         <p:spPr/>
         <p:txBody>
           <a:bodyPr>
-            <a:normAutofit fontScale="90000"/>
+            <a:normAutofit/>
           </a:bodyPr>
           <a:lstStyle/>
           <a:p>
             <a:r>
-              <a:rPr lang="de-DE" dirty="0"/>
+              <a:rPr lang="de-DE" sz="2300" dirty="0"/>
               <a:t>https://devcentral.f5.com/articles/intro-to-load-balancing-for-developers-ndash-the-algorithms</a:t>
             </a:r>
-            <a:endParaRPr lang="de-DE" dirty="0"/>
           </a:p>
         </p:txBody>
       </p:sp>
@@ -9616,7 +9737,7 @@
         </p:nvSpPr>
         <p:spPr>
           <a:xfrm>
-            <a:off x="1507272" y="1844824"/>
+            <a:off x="1507272" y="2852936"/>
             <a:ext cx="8748464" cy="2592288"/>
           </a:xfrm>
         </p:spPr>
@@ -9715,6 +9836,10 @@
               <a:rPr lang="de-DE" sz="2200" smtClean="0"/>
               <a:t>4</a:t>
             </a:fld>
+            <a:r>
+              <a:rPr lang="de-DE" sz="2200" dirty="0" smtClean="0"/>
+              <a:t>/31</a:t>
+            </a:r>
             <a:endParaRPr lang="de-DE" sz="2200" dirty="0"/>
           </a:p>
         </p:txBody>
@@ -9799,7 +9924,7 @@
         </p:nvSpPr>
         <p:spPr>
           <a:xfrm>
-            <a:off x="1554088" y="1844824"/>
+            <a:off x="1554088" y="2924944"/>
             <a:ext cx="8748464" cy="1872208"/>
           </a:xfrm>
         </p:spPr>
@@ -9872,6 +9997,10 @@
               <a:rPr lang="de-DE" sz="2200" smtClean="0"/>
               <a:t>5</a:t>
             </a:fld>
+            <a:r>
+              <a:rPr lang="de-DE" sz="2200" dirty="0" smtClean="0"/>
+              <a:t>/31</a:t>
+            </a:r>
             <a:endParaRPr lang="de-DE" sz="2200" dirty="0"/>
           </a:p>
         </p:txBody>
@@ -9956,7 +10085,7 @@
         </p:nvSpPr>
         <p:spPr>
           <a:xfrm>
-            <a:off x="1524000" y="1772816"/>
+            <a:off x="1524000" y="2780928"/>
             <a:ext cx="8748464" cy="2160240"/>
           </a:xfrm>
         </p:spPr>
@@ -10007,12 +10136,9 @@
             </a:r>
             <a:r>
               <a:rPr lang="de-AT" sz="2200" dirty="0" smtClean="0"/>
-              <a:t>nkludiert </a:t>
-            </a:r>
-            <a:r>
-              <a:rPr lang="de-AT" sz="2200" dirty="0"/>
-              <a:t>Server-Performance</a:t>
-            </a:r>
+              <a:t>nkludiert Server-Performance Monitoring</a:t>
+            </a:r>
+            <a:endParaRPr lang="de-AT" sz="2200" dirty="0"/>
           </a:p>
           <a:p>
             <a:pPr marL="971550" lvl="2" indent="-285750"/>
@@ -10050,6 +10176,10 @@
               <a:rPr lang="de-DE" sz="2200" smtClean="0"/>
               <a:t>6</a:t>
             </a:fld>
+            <a:r>
+              <a:rPr lang="de-DE" sz="2200" dirty="0" smtClean="0"/>
+              <a:t>/31</a:t>
+            </a:r>
             <a:endParaRPr lang="de-DE" sz="2200" dirty="0"/>
           </a:p>
         </p:txBody>
@@ -10233,8 +10363,8 @@
         </p:nvSpPr>
         <p:spPr>
           <a:xfrm>
-            <a:off x="1524000" y="1772816"/>
-            <a:ext cx="6336704" cy="2277547"/>
+            <a:off x="1524000" y="2786152"/>
+            <a:ext cx="7308304" cy="1938992"/>
           </a:xfrm>
           <a:prstGeom prst="rect">
             <a:avLst/>
@@ -10379,6 +10509,10 @@
               <a:rPr lang="de-DE" sz="2200" smtClean="0"/>
               <a:t>8</a:t>
             </a:fld>
+            <a:r>
+              <a:rPr lang="de-DE" sz="2200" dirty="0" smtClean="0"/>
+              <a:t>/31</a:t>
+            </a:r>
             <a:endParaRPr lang="de-DE" sz="2200" dirty="0"/>
           </a:p>
         </p:txBody>
@@ -10459,8 +10593,8 @@
         </p:nvSpPr>
         <p:spPr>
           <a:xfrm>
-            <a:off x="1524000" y="1772816"/>
-            <a:ext cx="6336704" cy="1938992"/>
+            <a:off x="1524000" y="2836674"/>
+            <a:ext cx="7740352" cy="1600438"/>
           </a:xfrm>
           <a:prstGeom prst="rect">
             <a:avLst/>
@@ -10623,7 +10757,10 @@
               <a:rPr lang="de-DE" sz="2200" smtClean="0"/>
               <a:t>9</a:t>
             </a:fld>
-            <a:endParaRPr lang="de-DE" sz="2200" dirty="0"/>
+            <a:r>
+              <a:rPr lang="de-DE" sz="2200" dirty="0" smtClean="0"/>
+              <a:t>/31</a:t>
+            </a:r>
           </a:p>
         </p:txBody>
       </p:sp>

</xml_diff>